<commit_message>
Week 4 and 5
</commit_message>
<xml_diff>
--- a/Week 4/Clase 7-8.pptx
+++ b/Week 4/Clase 7-8.pptx
@@ -268,7 +268,7 @@
           <a:p>
             <a:fld id="{D07E415D-6789-4496-A03F-69390932FA9B}" type="datetimeFigureOut">
               <a:rPr lang="en-US" smtClean="0"/>
-              <a:t>7/19/2021</a:t>
+              <a:t>7/20/2021</a:t>
             </a:fld>
             <a:endParaRPr lang="en-US"/>
           </a:p>
@@ -466,7 +466,7 @@
           <a:p>
             <a:fld id="{D07E415D-6789-4496-A03F-69390932FA9B}" type="datetimeFigureOut">
               <a:rPr lang="en-US" smtClean="0"/>
-              <a:t>7/19/2021</a:t>
+              <a:t>7/20/2021</a:t>
             </a:fld>
             <a:endParaRPr lang="en-US"/>
           </a:p>
@@ -674,7 +674,7 @@
           <a:p>
             <a:fld id="{D07E415D-6789-4496-A03F-69390932FA9B}" type="datetimeFigureOut">
               <a:rPr lang="en-US" smtClean="0"/>
-              <a:t>7/19/2021</a:t>
+              <a:t>7/20/2021</a:t>
             </a:fld>
             <a:endParaRPr lang="en-US"/>
           </a:p>
@@ -872,7 +872,7 @@
           <a:p>
             <a:fld id="{D07E415D-6789-4496-A03F-69390932FA9B}" type="datetimeFigureOut">
               <a:rPr lang="en-US" smtClean="0"/>
-              <a:t>7/19/2021</a:t>
+              <a:t>7/20/2021</a:t>
             </a:fld>
             <a:endParaRPr lang="en-US"/>
           </a:p>
@@ -1147,7 +1147,7 @@
           <a:p>
             <a:fld id="{D07E415D-6789-4496-A03F-69390932FA9B}" type="datetimeFigureOut">
               <a:rPr lang="en-US" smtClean="0"/>
-              <a:t>7/19/2021</a:t>
+              <a:t>7/20/2021</a:t>
             </a:fld>
             <a:endParaRPr lang="en-US"/>
           </a:p>
@@ -1412,7 +1412,7 @@
           <a:p>
             <a:fld id="{D07E415D-6789-4496-A03F-69390932FA9B}" type="datetimeFigureOut">
               <a:rPr lang="en-US" smtClean="0"/>
-              <a:t>7/19/2021</a:t>
+              <a:t>7/20/2021</a:t>
             </a:fld>
             <a:endParaRPr lang="en-US"/>
           </a:p>
@@ -1824,7 +1824,7 @@
           <a:p>
             <a:fld id="{D07E415D-6789-4496-A03F-69390932FA9B}" type="datetimeFigureOut">
               <a:rPr lang="en-US" smtClean="0"/>
-              <a:t>7/19/2021</a:t>
+              <a:t>7/20/2021</a:t>
             </a:fld>
             <a:endParaRPr lang="en-US"/>
           </a:p>
@@ -1965,7 +1965,7 @@
           <a:p>
             <a:fld id="{D07E415D-6789-4496-A03F-69390932FA9B}" type="datetimeFigureOut">
               <a:rPr lang="en-US" smtClean="0"/>
-              <a:t>7/19/2021</a:t>
+              <a:t>7/20/2021</a:t>
             </a:fld>
             <a:endParaRPr lang="en-US"/>
           </a:p>
@@ -2078,7 +2078,7 @@
           <a:p>
             <a:fld id="{D07E415D-6789-4496-A03F-69390932FA9B}" type="datetimeFigureOut">
               <a:rPr lang="en-US" smtClean="0"/>
-              <a:t>7/19/2021</a:t>
+              <a:t>7/20/2021</a:t>
             </a:fld>
             <a:endParaRPr lang="en-US"/>
           </a:p>
@@ -2389,7 +2389,7 @@
           <a:p>
             <a:fld id="{D07E415D-6789-4496-A03F-69390932FA9B}" type="datetimeFigureOut">
               <a:rPr lang="en-US" smtClean="0"/>
-              <a:t>7/19/2021</a:t>
+              <a:t>7/20/2021</a:t>
             </a:fld>
             <a:endParaRPr lang="en-US"/>
           </a:p>
@@ -2677,7 +2677,7 @@
           <a:p>
             <a:fld id="{D07E415D-6789-4496-A03F-69390932FA9B}" type="datetimeFigureOut">
               <a:rPr lang="en-US" smtClean="0"/>
-              <a:t>7/19/2021</a:t>
+              <a:t>7/20/2021</a:t>
             </a:fld>
             <a:endParaRPr lang="en-US"/>
           </a:p>
@@ -2918,7 +2918,7 @@
           <a:p>
             <a:fld id="{D07E415D-6789-4496-A03F-69390932FA9B}" type="datetimeFigureOut">
               <a:rPr lang="en-US" smtClean="0"/>
-              <a:t>7/19/2021</a:t>
+              <a:t>7/20/2021</a:t>
             </a:fld>
             <a:endParaRPr lang="en-US"/>
           </a:p>
@@ -4743,13 +4743,8 @@
             </a:pPr>
             <a:r>
               <a:rPr lang="en-US" sz="2200" dirty="0"/>
-              <a:t>+ </a:t>
-            </a:r>
-            <a:r>
-              <a:rPr lang="en-US" sz="2200" dirty="0" err="1"/>
-              <a:t>Hastags</a:t>
-            </a:r>
-            <a:endParaRPr lang="en-US" sz="2200" dirty="0"/>
+              <a:t>+ Hashtags</a:t>
+            </a:r>
           </a:p>
           <a:p>
             <a:pPr marL="0" indent="0">

</xml_diff>